<commit_message>
make colors more consistent
</commit_message>
<xml_diff>
--- a/figures/background/trie/tree_nodes.pptx
+++ b/figures/background/trie/tree_nodes.pptx
@@ -107,6 +107,11 @@
       </a:defRPr>
     </a:lvl9pPr>
   </p:defaultTextStyle>
+  <p:extLst>
+    <p:ext uri="{EFAFB233-063F-42B5-8137-9DF3F51BA10A}">
+      <p15:sldGuideLst xmlns:p15="http://schemas.microsoft.com/office/powerpoint/2012/main"/>
+    </p:ext>
+  </p:extLst>
 </p:presentation>
 </file>
 
@@ -192,7 +197,7 @@
           <a:p>
             <a:fld id="{2C1F0843-FCE9-4B45-866E-D23634F76A50}" type="datetimeFigureOut">
               <a:rPr lang="en-US" smtClean="0"/>
-              <a:t>4/19/19</a:t>
+              <a:t>4/23/19</a:t>
             </a:fld>
             <a:endParaRPr lang="en-US"/>
           </a:p>
@@ -256,38 +261,37 @@
           <a:p>
             <a:pPr lvl="0"/>
             <a:r>
-              <a:rPr lang="en-US" smtClean="0"/>
+              <a:rPr lang="en-US"/>
               <a:t>Click to edit Master text styles</a:t>
             </a:r>
           </a:p>
           <a:p>
             <a:pPr lvl="1"/>
             <a:r>
-              <a:rPr lang="en-US" smtClean="0"/>
+              <a:rPr lang="en-US"/>
               <a:t>Second level</a:t>
             </a:r>
           </a:p>
           <a:p>
             <a:pPr lvl="2"/>
             <a:r>
-              <a:rPr lang="en-US" smtClean="0"/>
+              <a:rPr lang="en-US"/>
               <a:t>Third level</a:t>
             </a:r>
           </a:p>
           <a:p>
             <a:pPr lvl="3"/>
             <a:r>
-              <a:rPr lang="en-US" smtClean="0"/>
+              <a:rPr lang="en-US"/>
               <a:t>Fourth level</a:t>
             </a:r>
           </a:p>
           <a:p>
             <a:pPr lvl="4"/>
             <a:r>
-              <a:rPr lang="en-US" smtClean="0"/>
+              <a:rPr lang="en-US"/>
               <a:t>Fifth level</a:t>
             </a:r>
-            <a:endParaRPr lang="en-US"/>
           </a:p>
         </p:txBody>
       </p:sp>
@@ -502,10 +506,9 @@
           </a:lstStyle>
           <a:p>
             <a:r>
-              <a:rPr lang="en-US" smtClean="0"/>
+              <a:rPr lang="en-US"/>
               <a:t>Click to edit Master title style</a:t>
             </a:r>
-            <a:endParaRPr lang="en-US"/>
           </a:p>
         </p:txBody>
       </p:sp>
@@ -567,10 +570,9 @@
           </a:lstStyle>
           <a:p>
             <a:r>
-              <a:rPr lang="en-US" smtClean="0"/>
+              <a:rPr lang="en-US"/>
               <a:t>Click to edit Master subtitle style</a:t>
             </a:r>
-            <a:endParaRPr lang="en-US"/>
           </a:p>
         </p:txBody>
       </p:sp>
@@ -591,7 +593,7 @@
           <a:p>
             <a:fld id="{360B1679-204B-C146-B086-D49A2ED3C229}" type="datetimeFigureOut">
               <a:rPr lang="en-US" smtClean="0"/>
-              <a:t>4/19/19</a:t>
+              <a:t>4/23/19</a:t>
             </a:fld>
             <a:endParaRPr lang="en-US"/>
           </a:p>
@@ -685,10 +687,9 @@
           <a:lstStyle/>
           <a:p>
             <a:r>
-              <a:rPr lang="en-US" smtClean="0"/>
+              <a:rPr lang="en-US"/>
               <a:t>Click to edit Master title style</a:t>
             </a:r>
-            <a:endParaRPr lang="en-US"/>
           </a:p>
         </p:txBody>
       </p:sp>
@@ -709,38 +710,37 @@
           <a:p>
             <a:pPr lvl="0"/>
             <a:r>
-              <a:rPr lang="en-US" smtClean="0"/>
+              <a:rPr lang="en-US"/>
               <a:t>Click to edit Master text styles</a:t>
             </a:r>
           </a:p>
           <a:p>
             <a:pPr lvl="1"/>
             <a:r>
-              <a:rPr lang="en-US" smtClean="0"/>
+              <a:rPr lang="en-US"/>
               <a:t>Second level</a:t>
             </a:r>
           </a:p>
           <a:p>
             <a:pPr lvl="2"/>
             <a:r>
-              <a:rPr lang="en-US" smtClean="0"/>
+              <a:rPr lang="en-US"/>
               <a:t>Third level</a:t>
             </a:r>
           </a:p>
           <a:p>
             <a:pPr lvl="3"/>
             <a:r>
-              <a:rPr lang="en-US" smtClean="0"/>
+              <a:rPr lang="en-US"/>
               <a:t>Fourth level</a:t>
             </a:r>
           </a:p>
           <a:p>
             <a:pPr lvl="4"/>
             <a:r>
-              <a:rPr lang="en-US" smtClean="0"/>
+              <a:rPr lang="en-US"/>
               <a:t>Fifth level</a:t>
             </a:r>
-            <a:endParaRPr lang="en-US"/>
           </a:p>
         </p:txBody>
       </p:sp>
@@ -761,7 +761,7 @@
           <a:p>
             <a:fld id="{360B1679-204B-C146-B086-D49A2ED3C229}" type="datetimeFigureOut">
               <a:rPr lang="en-US" smtClean="0"/>
-              <a:t>4/19/19</a:t>
+              <a:t>4/23/19</a:t>
             </a:fld>
             <a:endParaRPr lang="en-US"/>
           </a:p>
@@ -860,10 +860,9 @@
           <a:lstStyle/>
           <a:p>
             <a:r>
-              <a:rPr lang="en-US" smtClean="0"/>
+              <a:rPr lang="en-US"/>
               <a:t>Click to edit Master title style</a:t>
             </a:r>
-            <a:endParaRPr lang="en-US"/>
           </a:p>
         </p:txBody>
       </p:sp>
@@ -889,38 +888,37 @@
           <a:p>
             <a:pPr lvl="0"/>
             <a:r>
-              <a:rPr lang="en-US" smtClean="0"/>
+              <a:rPr lang="en-US"/>
               <a:t>Click to edit Master text styles</a:t>
             </a:r>
           </a:p>
           <a:p>
             <a:pPr lvl="1"/>
             <a:r>
-              <a:rPr lang="en-US" smtClean="0"/>
+              <a:rPr lang="en-US"/>
               <a:t>Second level</a:t>
             </a:r>
           </a:p>
           <a:p>
             <a:pPr lvl="2"/>
             <a:r>
-              <a:rPr lang="en-US" smtClean="0"/>
+              <a:rPr lang="en-US"/>
               <a:t>Third level</a:t>
             </a:r>
           </a:p>
           <a:p>
             <a:pPr lvl="3"/>
             <a:r>
-              <a:rPr lang="en-US" smtClean="0"/>
+              <a:rPr lang="en-US"/>
               <a:t>Fourth level</a:t>
             </a:r>
           </a:p>
           <a:p>
             <a:pPr lvl="4"/>
             <a:r>
-              <a:rPr lang="en-US" smtClean="0"/>
+              <a:rPr lang="en-US"/>
               <a:t>Fifth level</a:t>
             </a:r>
-            <a:endParaRPr lang="en-US"/>
           </a:p>
         </p:txBody>
       </p:sp>
@@ -941,7 +939,7 @@
           <a:p>
             <a:fld id="{360B1679-204B-C146-B086-D49A2ED3C229}" type="datetimeFigureOut">
               <a:rPr lang="en-US" smtClean="0"/>
-              <a:t>4/19/19</a:t>
+              <a:t>4/23/19</a:t>
             </a:fld>
             <a:endParaRPr lang="en-US"/>
           </a:p>
@@ -1035,10 +1033,9 @@
           <a:lstStyle/>
           <a:p>
             <a:r>
-              <a:rPr lang="en-US" smtClean="0"/>
+              <a:rPr lang="en-US"/>
               <a:t>Click to edit Master title style</a:t>
             </a:r>
-            <a:endParaRPr lang="en-US"/>
           </a:p>
         </p:txBody>
       </p:sp>
@@ -1059,38 +1056,37 @@
           <a:p>
             <a:pPr lvl="0"/>
             <a:r>
-              <a:rPr lang="en-US" smtClean="0"/>
+              <a:rPr lang="en-US"/>
               <a:t>Click to edit Master text styles</a:t>
             </a:r>
           </a:p>
           <a:p>
             <a:pPr lvl="1"/>
             <a:r>
-              <a:rPr lang="en-US" smtClean="0"/>
+              <a:rPr lang="en-US"/>
               <a:t>Second level</a:t>
             </a:r>
           </a:p>
           <a:p>
             <a:pPr lvl="2"/>
             <a:r>
-              <a:rPr lang="en-US" smtClean="0"/>
+              <a:rPr lang="en-US"/>
               <a:t>Third level</a:t>
             </a:r>
           </a:p>
           <a:p>
             <a:pPr lvl="3"/>
             <a:r>
-              <a:rPr lang="en-US" smtClean="0"/>
+              <a:rPr lang="en-US"/>
               <a:t>Fourth level</a:t>
             </a:r>
           </a:p>
           <a:p>
             <a:pPr lvl="4"/>
             <a:r>
-              <a:rPr lang="en-US" smtClean="0"/>
+              <a:rPr lang="en-US"/>
               <a:t>Fifth level</a:t>
             </a:r>
-            <a:endParaRPr lang="en-US"/>
           </a:p>
         </p:txBody>
       </p:sp>
@@ -1111,7 +1107,7 @@
           <a:p>
             <a:fld id="{360B1679-204B-C146-B086-D49A2ED3C229}" type="datetimeFigureOut">
               <a:rPr lang="en-US" smtClean="0"/>
-              <a:t>4/19/19</a:t>
+              <a:t>4/23/19</a:t>
             </a:fld>
             <a:endParaRPr lang="en-US"/>
           </a:p>
@@ -1214,10 +1210,9 @@
           </a:lstStyle>
           <a:p>
             <a:r>
-              <a:rPr lang="en-US" smtClean="0"/>
+              <a:rPr lang="en-US"/>
               <a:t>Click to edit Master title style</a:t>
             </a:r>
-            <a:endParaRPr lang="en-US"/>
           </a:p>
         </p:txBody>
       </p:sp>
@@ -1334,7 +1329,7 @@
           <a:p>
             <a:pPr lvl="0"/>
             <a:r>
-              <a:rPr lang="en-US" smtClean="0"/>
+              <a:rPr lang="en-US"/>
               <a:t>Click to edit Master text styles</a:t>
             </a:r>
           </a:p>
@@ -1357,7 +1352,7 @@
           <a:p>
             <a:fld id="{360B1679-204B-C146-B086-D49A2ED3C229}" type="datetimeFigureOut">
               <a:rPr lang="en-US" smtClean="0"/>
-              <a:t>4/19/19</a:t>
+              <a:t>4/23/19</a:t>
             </a:fld>
             <a:endParaRPr lang="en-US"/>
           </a:p>
@@ -1451,10 +1446,9 @@
           <a:lstStyle/>
           <a:p>
             <a:r>
-              <a:rPr lang="en-US" smtClean="0"/>
+              <a:rPr lang="en-US"/>
               <a:t>Click to edit Master title style</a:t>
             </a:r>
-            <a:endParaRPr lang="en-US"/>
           </a:p>
         </p:txBody>
       </p:sp>
@@ -1480,38 +1474,37 @@
           <a:p>
             <a:pPr lvl="0"/>
             <a:r>
-              <a:rPr lang="en-US" smtClean="0"/>
+              <a:rPr lang="en-US"/>
               <a:t>Click to edit Master text styles</a:t>
             </a:r>
           </a:p>
           <a:p>
             <a:pPr lvl="1"/>
             <a:r>
-              <a:rPr lang="en-US" smtClean="0"/>
+              <a:rPr lang="en-US"/>
               <a:t>Second level</a:t>
             </a:r>
           </a:p>
           <a:p>
             <a:pPr lvl="2"/>
             <a:r>
-              <a:rPr lang="en-US" smtClean="0"/>
+              <a:rPr lang="en-US"/>
               <a:t>Third level</a:t>
             </a:r>
           </a:p>
           <a:p>
             <a:pPr lvl="3"/>
             <a:r>
-              <a:rPr lang="en-US" smtClean="0"/>
+              <a:rPr lang="en-US"/>
               <a:t>Fourth level</a:t>
             </a:r>
           </a:p>
           <a:p>
             <a:pPr lvl="4"/>
             <a:r>
-              <a:rPr lang="en-US" smtClean="0"/>
+              <a:rPr lang="en-US"/>
               <a:t>Fifth level</a:t>
             </a:r>
-            <a:endParaRPr lang="en-US"/>
           </a:p>
         </p:txBody>
       </p:sp>
@@ -1537,38 +1530,37 @@
           <a:p>
             <a:pPr lvl="0"/>
             <a:r>
-              <a:rPr lang="en-US" smtClean="0"/>
+              <a:rPr lang="en-US"/>
               <a:t>Click to edit Master text styles</a:t>
             </a:r>
           </a:p>
           <a:p>
             <a:pPr lvl="1"/>
             <a:r>
-              <a:rPr lang="en-US" smtClean="0"/>
+              <a:rPr lang="en-US"/>
               <a:t>Second level</a:t>
             </a:r>
           </a:p>
           <a:p>
             <a:pPr lvl="2"/>
             <a:r>
-              <a:rPr lang="en-US" smtClean="0"/>
+              <a:rPr lang="en-US"/>
               <a:t>Third level</a:t>
             </a:r>
           </a:p>
           <a:p>
             <a:pPr lvl="3"/>
             <a:r>
-              <a:rPr lang="en-US" smtClean="0"/>
+              <a:rPr lang="en-US"/>
               <a:t>Fourth level</a:t>
             </a:r>
           </a:p>
           <a:p>
             <a:pPr lvl="4"/>
             <a:r>
-              <a:rPr lang="en-US" smtClean="0"/>
+              <a:rPr lang="en-US"/>
               <a:t>Fifth level</a:t>
             </a:r>
-            <a:endParaRPr lang="en-US"/>
           </a:p>
         </p:txBody>
       </p:sp>
@@ -1589,7 +1581,7 @@
           <a:p>
             <a:fld id="{360B1679-204B-C146-B086-D49A2ED3C229}" type="datetimeFigureOut">
               <a:rPr lang="en-US" smtClean="0"/>
-              <a:t>4/19/19</a:t>
+              <a:t>4/23/19</a:t>
             </a:fld>
             <a:endParaRPr lang="en-US"/>
           </a:p>
@@ -1688,10 +1680,9 @@
           <a:lstStyle/>
           <a:p>
             <a:r>
-              <a:rPr lang="en-US" smtClean="0"/>
+              <a:rPr lang="en-US"/>
               <a:t>Click to edit Master title style</a:t>
             </a:r>
-            <a:endParaRPr lang="en-US"/>
           </a:p>
         </p:txBody>
       </p:sp>
@@ -1754,7 +1745,7 @@
           <a:p>
             <a:pPr lvl="0"/>
             <a:r>
-              <a:rPr lang="en-US" smtClean="0"/>
+              <a:rPr lang="en-US"/>
               <a:t>Click to edit Master text styles</a:t>
             </a:r>
           </a:p>
@@ -1782,38 +1773,37 @@
           <a:p>
             <a:pPr lvl="0"/>
             <a:r>
-              <a:rPr lang="en-US" smtClean="0"/>
+              <a:rPr lang="en-US"/>
               <a:t>Click to edit Master text styles</a:t>
             </a:r>
           </a:p>
           <a:p>
             <a:pPr lvl="1"/>
             <a:r>
-              <a:rPr lang="en-US" smtClean="0"/>
+              <a:rPr lang="en-US"/>
               <a:t>Second level</a:t>
             </a:r>
           </a:p>
           <a:p>
             <a:pPr lvl="2"/>
             <a:r>
-              <a:rPr lang="en-US" smtClean="0"/>
+              <a:rPr lang="en-US"/>
               <a:t>Third level</a:t>
             </a:r>
           </a:p>
           <a:p>
             <a:pPr lvl="3"/>
             <a:r>
-              <a:rPr lang="en-US" smtClean="0"/>
+              <a:rPr lang="en-US"/>
               <a:t>Fourth level</a:t>
             </a:r>
           </a:p>
           <a:p>
             <a:pPr lvl="4"/>
             <a:r>
-              <a:rPr lang="en-US" smtClean="0"/>
+              <a:rPr lang="en-US"/>
               <a:t>Fifth level</a:t>
             </a:r>
-            <a:endParaRPr lang="en-US"/>
           </a:p>
         </p:txBody>
       </p:sp>
@@ -1876,7 +1866,7 @@
           <a:p>
             <a:pPr lvl="0"/>
             <a:r>
-              <a:rPr lang="en-US" smtClean="0"/>
+              <a:rPr lang="en-US"/>
               <a:t>Click to edit Master text styles</a:t>
             </a:r>
           </a:p>
@@ -1904,38 +1894,37 @@
           <a:p>
             <a:pPr lvl="0"/>
             <a:r>
-              <a:rPr lang="en-US" smtClean="0"/>
+              <a:rPr lang="en-US"/>
               <a:t>Click to edit Master text styles</a:t>
             </a:r>
           </a:p>
           <a:p>
             <a:pPr lvl="1"/>
             <a:r>
-              <a:rPr lang="en-US" smtClean="0"/>
+              <a:rPr lang="en-US"/>
               <a:t>Second level</a:t>
             </a:r>
           </a:p>
           <a:p>
             <a:pPr lvl="2"/>
             <a:r>
-              <a:rPr lang="en-US" smtClean="0"/>
+              <a:rPr lang="en-US"/>
               <a:t>Third level</a:t>
             </a:r>
           </a:p>
           <a:p>
             <a:pPr lvl="3"/>
             <a:r>
-              <a:rPr lang="en-US" smtClean="0"/>
+              <a:rPr lang="en-US"/>
               <a:t>Fourth level</a:t>
             </a:r>
           </a:p>
           <a:p>
             <a:pPr lvl="4"/>
             <a:r>
-              <a:rPr lang="en-US" smtClean="0"/>
+              <a:rPr lang="en-US"/>
               <a:t>Fifth level</a:t>
             </a:r>
-            <a:endParaRPr lang="en-US"/>
           </a:p>
         </p:txBody>
       </p:sp>
@@ -1956,7 +1945,7 @@
           <a:p>
             <a:fld id="{360B1679-204B-C146-B086-D49A2ED3C229}" type="datetimeFigureOut">
               <a:rPr lang="en-US" smtClean="0"/>
-              <a:t>4/19/19</a:t>
+              <a:t>4/23/19</a:t>
             </a:fld>
             <a:endParaRPr lang="en-US"/>
           </a:p>
@@ -2050,10 +2039,9 @@
           <a:lstStyle/>
           <a:p>
             <a:r>
-              <a:rPr lang="en-US" smtClean="0"/>
+              <a:rPr lang="en-US"/>
               <a:t>Click to edit Master title style</a:t>
             </a:r>
-            <a:endParaRPr lang="en-US"/>
           </a:p>
         </p:txBody>
       </p:sp>
@@ -2074,7 +2062,7 @@
           <a:p>
             <a:fld id="{360B1679-204B-C146-B086-D49A2ED3C229}" type="datetimeFigureOut">
               <a:rPr lang="en-US" smtClean="0"/>
-              <a:t>4/19/19</a:t>
+              <a:t>4/23/19</a:t>
             </a:fld>
             <a:endParaRPr lang="en-US"/>
           </a:p>
@@ -2169,7 +2157,7 @@
           <a:p>
             <a:fld id="{360B1679-204B-C146-B086-D49A2ED3C229}" type="datetimeFigureOut">
               <a:rPr lang="en-US" smtClean="0"/>
-              <a:t>4/19/19</a:t>
+              <a:t>4/23/19</a:t>
             </a:fld>
             <a:endParaRPr lang="en-US"/>
           </a:p>
@@ -2272,10 +2260,9 @@
           </a:lstStyle>
           <a:p>
             <a:r>
-              <a:rPr lang="en-US" smtClean="0"/>
+              <a:rPr lang="en-US"/>
               <a:t>Click to edit Master title style</a:t>
             </a:r>
-            <a:endParaRPr lang="en-US"/>
           </a:p>
         </p:txBody>
       </p:sp>
@@ -2329,38 +2316,37 @@
           <a:p>
             <a:pPr lvl="0"/>
             <a:r>
-              <a:rPr lang="en-US" smtClean="0"/>
+              <a:rPr lang="en-US"/>
               <a:t>Click to edit Master text styles</a:t>
             </a:r>
           </a:p>
           <a:p>
             <a:pPr lvl="1"/>
             <a:r>
-              <a:rPr lang="en-US" smtClean="0"/>
+              <a:rPr lang="en-US"/>
               <a:t>Second level</a:t>
             </a:r>
           </a:p>
           <a:p>
             <a:pPr lvl="2"/>
             <a:r>
-              <a:rPr lang="en-US" smtClean="0"/>
+              <a:rPr lang="en-US"/>
               <a:t>Third level</a:t>
             </a:r>
           </a:p>
           <a:p>
             <a:pPr lvl="3"/>
             <a:r>
-              <a:rPr lang="en-US" smtClean="0"/>
+              <a:rPr lang="en-US"/>
               <a:t>Fourth level</a:t>
             </a:r>
           </a:p>
           <a:p>
             <a:pPr lvl="4"/>
             <a:r>
-              <a:rPr lang="en-US" smtClean="0"/>
+              <a:rPr lang="en-US"/>
               <a:t>Fifth level</a:t>
             </a:r>
-            <a:endParaRPr lang="en-US"/>
           </a:p>
         </p:txBody>
       </p:sp>
@@ -2423,7 +2409,7 @@
           <a:p>
             <a:pPr lvl="0"/>
             <a:r>
-              <a:rPr lang="en-US" smtClean="0"/>
+              <a:rPr lang="en-US"/>
               <a:t>Click to edit Master text styles</a:t>
             </a:r>
           </a:p>
@@ -2446,7 +2432,7 @@
           <a:p>
             <a:fld id="{360B1679-204B-C146-B086-D49A2ED3C229}" type="datetimeFigureOut">
               <a:rPr lang="en-US" smtClean="0"/>
-              <a:t>4/19/19</a:t>
+              <a:t>4/23/19</a:t>
             </a:fld>
             <a:endParaRPr lang="en-US"/>
           </a:p>
@@ -2549,10 +2535,9 @@
           </a:lstStyle>
           <a:p>
             <a:r>
-              <a:rPr lang="en-US" smtClean="0"/>
+              <a:rPr lang="en-US"/>
               <a:t>Click to edit Master title style</a:t>
             </a:r>
-            <a:endParaRPr lang="en-US"/>
           </a:p>
         </p:txBody>
       </p:sp>
@@ -2676,7 +2661,7 @@
           <a:p>
             <a:pPr lvl="0"/>
             <a:r>
-              <a:rPr lang="en-US" smtClean="0"/>
+              <a:rPr lang="en-US"/>
               <a:t>Click to edit Master text styles</a:t>
             </a:r>
           </a:p>
@@ -2699,7 +2684,7 @@
           <a:p>
             <a:fld id="{360B1679-204B-C146-B086-D49A2ED3C229}" type="datetimeFigureOut">
               <a:rPr lang="en-US" smtClean="0"/>
-              <a:t>4/19/19</a:t>
+              <a:t>4/23/19</a:t>
             </a:fld>
             <a:endParaRPr lang="en-US"/>
           </a:p>
@@ -2808,10 +2793,9 @@
           <a:lstStyle/>
           <a:p>
             <a:r>
-              <a:rPr lang="en-US" smtClean="0"/>
+              <a:rPr lang="en-US"/>
               <a:t>Click to edit Master title style</a:t>
             </a:r>
-            <a:endParaRPr lang="en-US"/>
           </a:p>
         </p:txBody>
       </p:sp>
@@ -2842,38 +2826,37 @@
           <a:p>
             <a:pPr lvl="0"/>
             <a:r>
-              <a:rPr lang="en-US" smtClean="0"/>
+              <a:rPr lang="en-US"/>
               <a:t>Click to edit Master text styles</a:t>
             </a:r>
           </a:p>
           <a:p>
             <a:pPr lvl="1"/>
             <a:r>
-              <a:rPr lang="en-US" smtClean="0"/>
+              <a:rPr lang="en-US"/>
               <a:t>Second level</a:t>
             </a:r>
           </a:p>
           <a:p>
             <a:pPr lvl="2"/>
             <a:r>
-              <a:rPr lang="en-US" smtClean="0"/>
+              <a:rPr lang="en-US"/>
               <a:t>Third level</a:t>
             </a:r>
           </a:p>
           <a:p>
             <a:pPr lvl="3"/>
             <a:r>
-              <a:rPr lang="en-US" smtClean="0"/>
+              <a:rPr lang="en-US"/>
               <a:t>Fourth level</a:t>
             </a:r>
           </a:p>
           <a:p>
             <a:pPr lvl="4"/>
             <a:r>
-              <a:rPr lang="en-US" smtClean="0"/>
+              <a:rPr lang="en-US"/>
               <a:t>Fifth level</a:t>
             </a:r>
-            <a:endParaRPr lang="en-US"/>
           </a:p>
         </p:txBody>
       </p:sp>
@@ -2912,7 +2895,7 @@
           <a:p>
             <a:fld id="{360B1679-204B-C146-B086-D49A2ED3C229}" type="datetimeFigureOut">
               <a:rPr lang="en-US" smtClean="0"/>
-              <a:t>4/19/19</a:t>
+              <a:t>4/23/19</a:t>
             </a:fld>
             <a:endParaRPr lang="en-US"/>
           </a:p>
@@ -3432,7 +3415,7 @@
       </p:cxnSp>
       <p:sp>
         <p:nvSpPr>
-          <p:cNvPr id="10" name="Rectangle 9"/>
+          <p:cNvPr id="10" name="Rounded Rectangle 9"/>
           <p:cNvSpPr/>
           <p:nvPr/>
         </p:nvSpPr>
@@ -3441,11 +3424,11 @@
             <a:off x="3532472" y="1434165"/>
             <a:ext cx="7594332" cy="394635"/>
           </a:xfrm>
-          <a:prstGeom prst="rect">
+          <a:prstGeom prst="roundRect">
             <a:avLst/>
           </a:prstGeom>
           <a:solidFill>
-            <a:schemeClr val="accent2"/>
+            <a:schemeClr val="accent1"/>
           </a:solidFill>
         </p:spPr>
         <p:style>
@@ -3470,26 +3453,25 @@
           <a:p>
             <a:pPr algn="ctr"/>
             <a:r>
-              <a:rPr lang="en-US" dirty="0" smtClean="0"/>
+              <a:rPr lang="en-US" dirty="0"/>
               <a:t>Root Node. Children: [0x3244</a:t>
             </a:r>
             <a:r>
-              <a:rPr lang="mr-IN" dirty="0" smtClean="0"/>
+              <a:rPr lang="mr-IN" dirty="0"/>
               <a:t>…</a:t>
             </a:r>
             <a:r>
-              <a:rPr lang="en-US" dirty="0" smtClean="0"/>
+              <a:rPr lang="en-US" dirty="0"/>
               <a:t>f31e, 0x5484</a:t>
             </a:r>
             <a:r>
-              <a:rPr lang="mr-IN" dirty="0" smtClean="0"/>
+              <a:rPr lang="mr-IN" dirty="0"/>
               <a:t>…</a:t>
             </a:r>
             <a:r>
-              <a:rPr lang="en-US" dirty="0" smtClean="0"/>
+              <a:rPr lang="en-US" dirty="0"/>
               <a:t>20f1]</a:t>
             </a:r>
-            <a:endParaRPr lang="en-US" dirty="0"/>
           </a:p>
         </p:txBody>
       </p:sp>
@@ -3517,18 +3499,17 @@
           <a:p>
             <a:pPr algn="ctr"/>
             <a:r>
-              <a:rPr lang="en-US" dirty="0" smtClean="0"/>
+              <a:rPr lang="en-US" dirty="0"/>
               <a:t>0xb45a</a:t>
             </a:r>
             <a:r>
-              <a:rPr lang="mr-IN" dirty="0" smtClean="0"/>
+              <a:rPr lang="mr-IN" dirty="0"/>
               <a:t>…</a:t>
             </a:r>
             <a:r>
-              <a:rPr lang="en-US" dirty="0" smtClean="0"/>
+              <a:rPr lang="en-US" dirty="0"/>
               <a:t>3e33</a:t>
             </a:r>
-            <a:endParaRPr lang="en-US" dirty="0"/>
           </a:p>
         </p:txBody>
       </p:sp>
@@ -3569,7 +3550,7 @@
       </p:cxnSp>
       <p:sp>
         <p:nvSpPr>
-          <p:cNvPr id="16" name="Rectangle 15"/>
+          <p:cNvPr id="16" name="Rounded Rectangle 15"/>
           <p:cNvSpPr/>
           <p:nvPr/>
         </p:nvSpPr>
@@ -3578,11 +3559,11 @@
             <a:off x="3532472" y="2094581"/>
             <a:ext cx="7594332" cy="394635"/>
           </a:xfrm>
-          <a:prstGeom prst="rect">
+          <a:prstGeom prst="roundRect">
             <a:avLst/>
           </a:prstGeom>
           <a:solidFill>
-            <a:schemeClr val="accent2"/>
+            <a:schemeClr val="accent1"/>
           </a:solidFill>
         </p:spPr>
         <p:style>
@@ -3607,26 +3588,25 @@
           <a:p>
             <a:pPr algn="ctr"/>
             <a:r>
-              <a:rPr lang="en-US" dirty="0" smtClean="0"/>
+              <a:rPr lang="en-US" dirty="0"/>
               <a:t>Non-leaf Node. Children: [0xf45e</a:t>
             </a:r>
             <a:r>
-              <a:rPr lang="mr-IN" dirty="0" smtClean="0"/>
+              <a:rPr lang="mr-IN" dirty="0"/>
               <a:t>…</a:t>
             </a:r>
             <a:r>
-              <a:rPr lang="en-US" dirty="0" smtClean="0"/>
+              <a:rPr lang="en-US" dirty="0"/>
               <a:t>3789, 0xa38c</a:t>
             </a:r>
             <a:r>
-              <a:rPr lang="mr-IN" dirty="0" smtClean="0"/>
+              <a:rPr lang="mr-IN" dirty="0"/>
               <a:t>…</a:t>
             </a:r>
             <a:r>
-              <a:rPr lang="en-US" dirty="0" smtClean="0"/>
+              <a:rPr lang="en-US" dirty="0"/>
               <a:t>f32b]</a:t>
             </a:r>
-            <a:endParaRPr lang="en-US" dirty="0"/>
           </a:p>
         </p:txBody>
       </p:sp>
@@ -3654,18 +3634,17 @@
           <a:p>
             <a:pPr algn="ctr"/>
             <a:r>
-              <a:rPr lang="en-US" dirty="0" smtClean="0"/>
+              <a:rPr lang="en-US" dirty="0"/>
               <a:t>0x3244</a:t>
             </a:r>
             <a:r>
-              <a:rPr lang="mr-IN" dirty="0" smtClean="0"/>
+              <a:rPr lang="mr-IN" dirty="0"/>
               <a:t>…</a:t>
             </a:r>
             <a:r>
-              <a:rPr lang="en-US" dirty="0" smtClean="0"/>
+              <a:rPr lang="en-US" dirty="0"/>
               <a:t>f31e</a:t>
             </a:r>
-            <a:endParaRPr lang="en-US" dirty="0"/>
           </a:p>
         </p:txBody>
       </p:sp>
@@ -3706,7 +3685,7 @@
       </p:cxnSp>
       <p:sp>
         <p:nvSpPr>
-          <p:cNvPr id="19" name="Rectangle 18"/>
+          <p:cNvPr id="19" name="Rounded Rectangle 18"/>
           <p:cNvSpPr/>
           <p:nvPr/>
         </p:nvSpPr>
@@ -3715,11 +3694,11 @@
             <a:off x="3532472" y="2754997"/>
             <a:ext cx="7594332" cy="394635"/>
           </a:xfrm>
-          <a:prstGeom prst="rect">
+          <a:prstGeom prst="roundRect">
             <a:avLst/>
           </a:prstGeom>
           <a:solidFill>
-            <a:schemeClr val="accent2"/>
+            <a:schemeClr val="accent1"/>
           </a:solidFill>
         </p:spPr>
         <p:style>
@@ -3744,22 +3723,17 @@
           <a:p>
             <a:pPr algn="ctr"/>
             <a:r>
-              <a:rPr lang="en-US" dirty="0" smtClean="0"/>
-              <a:t>Non-leaf </a:t>
-            </a:r>
-            <a:r>
-              <a:rPr lang="en-US" dirty="0" smtClean="0"/>
-              <a:t>Node. Children: [0x78b4...4bc7, 0x983b</a:t>
-            </a:r>
-            <a:r>
-              <a:rPr lang="mr-IN" dirty="0" smtClean="0"/>
+              <a:rPr lang="en-US" dirty="0"/>
+              <a:t>Non-leaf Node. Children: [0x78b4...4bc7, 0x983b</a:t>
+            </a:r>
+            <a:r>
+              <a:rPr lang="mr-IN" dirty="0"/>
               <a:t>…</a:t>
             </a:r>
             <a:r>
-              <a:rPr lang="en-US" dirty="0" smtClean="0"/>
+              <a:rPr lang="en-US" dirty="0"/>
               <a:t>ff3e]</a:t>
             </a:r>
-            <a:endParaRPr lang="en-US" dirty="0"/>
           </a:p>
         </p:txBody>
       </p:sp>
@@ -3787,18 +3761,17 @@
           <a:p>
             <a:pPr algn="ctr"/>
             <a:r>
-              <a:rPr lang="en-US" dirty="0" smtClean="0"/>
+              <a:rPr lang="en-US" dirty="0"/>
               <a:t>0x5484</a:t>
             </a:r>
             <a:r>
-              <a:rPr lang="mr-IN" dirty="0" smtClean="0"/>
+              <a:rPr lang="mr-IN" dirty="0"/>
               <a:t>…</a:t>
             </a:r>
             <a:r>
-              <a:rPr lang="en-US" dirty="0" smtClean="0"/>
+              <a:rPr lang="en-US" dirty="0"/>
               <a:t>20f1</a:t>
             </a:r>
-            <a:endParaRPr lang="en-US" dirty="0"/>
           </a:p>
         </p:txBody>
       </p:sp>
@@ -3839,7 +3812,7 @@
       </p:cxnSp>
       <p:sp>
         <p:nvSpPr>
-          <p:cNvPr id="22" name="Rectangle 21"/>
+          <p:cNvPr id="22" name="Rounded Rectangle 21"/>
           <p:cNvSpPr/>
           <p:nvPr/>
         </p:nvSpPr>
@@ -3848,11 +3821,11 @@
             <a:off x="3532472" y="3425298"/>
             <a:ext cx="7594332" cy="394635"/>
           </a:xfrm>
-          <a:prstGeom prst="rect">
+          <a:prstGeom prst="roundRect">
             <a:avLst/>
           </a:prstGeom>
           <a:solidFill>
-            <a:schemeClr val="accent2"/>
+            <a:schemeClr val="accent1"/>
           </a:solidFill>
         </p:spPr>
         <p:style>
@@ -3877,10 +3850,9 @@
           <a:p>
             <a:pPr algn="ctr"/>
             <a:r>
-              <a:rPr lang="en-US" dirty="0" smtClean="0"/>
+              <a:rPr lang="en-US" dirty="0"/>
               <a:t>Leaf Node. Balance: 100 ETH</a:t>
             </a:r>
-            <a:endParaRPr lang="en-US" dirty="0"/>
           </a:p>
         </p:txBody>
       </p:sp>
@@ -3908,18 +3880,17 @@
           <a:p>
             <a:pPr algn="ctr"/>
             <a:r>
-              <a:rPr lang="en-US" dirty="0" smtClean="0"/>
+              <a:rPr lang="en-US" dirty="0"/>
               <a:t>0xf45e</a:t>
             </a:r>
             <a:r>
-              <a:rPr lang="mr-IN" dirty="0" smtClean="0"/>
+              <a:rPr lang="mr-IN" dirty="0"/>
               <a:t>…</a:t>
             </a:r>
             <a:r>
-              <a:rPr lang="en-US" dirty="0" smtClean="0"/>
+              <a:rPr lang="en-US" dirty="0"/>
               <a:t>3789</a:t>
             </a:r>
-            <a:endParaRPr lang="en-US" dirty="0"/>
           </a:p>
         </p:txBody>
       </p:sp>
@@ -3960,7 +3931,7 @@
       </p:cxnSp>
       <p:sp>
         <p:nvSpPr>
-          <p:cNvPr id="25" name="Rectangle 24"/>
+          <p:cNvPr id="25" name="Rounded Rectangle 24"/>
           <p:cNvSpPr/>
           <p:nvPr/>
         </p:nvSpPr>
@@ -3969,11 +3940,11 @@
             <a:off x="3532472" y="4069592"/>
             <a:ext cx="7594332" cy="394635"/>
           </a:xfrm>
-          <a:prstGeom prst="rect">
+          <a:prstGeom prst="roundRect">
             <a:avLst/>
           </a:prstGeom>
           <a:solidFill>
-            <a:schemeClr val="accent2"/>
+            <a:schemeClr val="accent1"/>
           </a:solidFill>
         </p:spPr>
         <p:style>
@@ -3998,10 +3969,9 @@
           <a:p>
             <a:pPr algn="ctr"/>
             <a:r>
-              <a:rPr lang="en-US" dirty="0" smtClean="0"/>
+              <a:rPr lang="en-US" dirty="0"/>
               <a:t>Leaf Node. Balance: 10 ETH</a:t>
             </a:r>
-            <a:endParaRPr lang="en-US" dirty="0"/>
           </a:p>
         </p:txBody>
       </p:sp>
@@ -4029,18 +3999,17 @@
           <a:p>
             <a:pPr algn="ctr"/>
             <a:r>
-              <a:rPr lang="en-US" dirty="0" smtClean="0"/>
+              <a:rPr lang="en-US" dirty="0"/>
               <a:t>0xa38c</a:t>
             </a:r>
             <a:r>
-              <a:rPr lang="mr-IN" dirty="0" smtClean="0"/>
+              <a:rPr lang="mr-IN" dirty="0"/>
               <a:t>…</a:t>
             </a:r>
             <a:r>
-              <a:rPr lang="en-US" dirty="0" smtClean="0"/>
+              <a:rPr lang="en-US" dirty="0"/>
               <a:t>f32b</a:t>
             </a:r>
-            <a:endParaRPr lang="en-US" dirty="0"/>
           </a:p>
         </p:txBody>
       </p:sp>
@@ -4081,7 +4050,7 @@
       </p:cxnSp>
       <p:sp>
         <p:nvSpPr>
-          <p:cNvPr id="28" name="Rectangle 27"/>
+          <p:cNvPr id="28" name="Rounded Rectangle 27"/>
           <p:cNvSpPr/>
           <p:nvPr/>
         </p:nvSpPr>
@@ -4090,11 +4059,11 @@
             <a:off x="3532472" y="4730008"/>
             <a:ext cx="7594332" cy="394635"/>
           </a:xfrm>
-          <a:prstGeom prst="rect">
+          <a:prstGeom prst="roundRect">
             <a:avLst/>
           </a:prstGeom>
           <a:solidFill>
-            <a:schemeClr val="accent2"/>
+            <a:schemeClr val="accent1"/>
           </a:solidFill>
         </p:spPr>
         <p:style>
@@ -4119,10 +4088,9 @@
           <a:p>
             <a:pPr algn="ctr"/>
             <a:r>
-              <a:rPr lang="en-US" dirty="0" smtClean="0"/>
+              <a:rPr lang="en-US" dirty="0"/>
               <a:t>Leaf Node. Balance: 12 ETH</a:t>
             </a:r>
-            <a:endParaRPr lang="en-US" dirty="0"/>
           </a:p>
         </p:txBody>
       </p:sp>
@@ -4150,16 +4118,15 @@
           <a:p>
             <a:pPr algn="ctr"/>
             <a:r>
-              <a:rPr lang="en-US" dirty="0" smtClean="0"/>
+              <a:rPr lang="en-US" dirty="0"/>
               <a:t>0x78b4...4bc7</a:t>
             </a:r>
-            <a:endParaRPr lang="en-US" dirty="0"/>
-          </a:p>
-        </p:txBody>
-      </p:sp>
-      <p:sp>
-        <p:nvSpPr>
-          <p:cNvPr id="31" name="Rectangle 30"/>
+          </a:p>
+        </p:txBody>
+      </p:sp>
+      <p:sp>
+        <p:nvSpPr>
+          <p:cNvPr id="31" name="Rounded Rectangle 30"/>
           <p:cNvSpPr/>
           <p:nvPr/>
         </p:nvSpPr>
@@ -4168,11 +4135,11 @@
             <a:off x="3532472" y="5390424"/>
             <a:ext cx="7594332" cy="394635"/>
           </a:xfrm>
-          <a:prstGeom prst="rect">
+          <a:prstGeom prst="roundRect">
             <a:avLst/>
           </a:prstGeom>
           <a:solidFill>
-            <a:schemeClr val="accent2"/>
+            <a:schemeClr val="accent1"/>
           </a:solidFill>
         </p:spPr>
         <p:style>
@@ -4197,10 +4164,9 @@
           <a:p>
             <a:pPr algn="ctr"/>
             <a:r>
-              <a:rPr lang="en-US" dirty="0" smtClean="0"/>
+              <a:rPr lang="en-US" dirty="0"/>
               <a:t>Leaf Node. Balance: 50 ETH</a:t>
             </a:r>
-            <a:endParaRPr lang="en-US" dirty="0"/>
           </a:p>
         </p:txBody>
       </p:sp>
@@ -4228,18 +4194,17 @@
           <a:p>
             <a:pPr algn="ctr"/>
             <a:r>
-              <a:rPr lang="en-US" dirty="0" smtClean="0"/>
+              <a:rPr lang="en-US" dirty="0"/>
               <a:t>0x983b</a:t>
             </a:r>
             <a:r>
-              <a:rPr lang="mr-IN" dirty="0" smtClean="0"/>
+              <a:rPr lang="mr-IN" dirty="0"/>
               <a:t>…</a:t>
             </a:r>
             <a:r>
-              <a:rPr lang="en-US" dirty="0" smtClean="0"/>
+              <a:rPr lang="en-US" dirty="0"/>
               <a:t>ff3e</a:t>
             </a:r>
-            <a:endParaRPr lang="en-US" dirty="0"/>
           </a:p>
         </p:txBody>
       </p:sp>
@@ -4302,10 +4267,9 @@
           <a:p>
             <a:pPr algn="ctr"/>
             <a:r>
-              <a:rPr lang="en-US" dirty="0" smtClean="0"/>
+              <a:rPr lang="en-US" dirty="0"/>
               <a:t>Node Hash</a:t>
             </a:r>
-            <a:endParaRPr lang="en-US" dirty="0"/>
           </a:p>
         </p:txBody>
       </p:sp>
@@ -4333,7 +4297,7 @@
           <a:p>
             <a:pPr algn="ctr"/>
             <a:r>
-              <a:rPr lang="en-US" smtClean="0"/>
+              <a:rPr lang="en-US"/>
               <a:t>Node</a:t>
             </a:r>
             <a:endParaRPr lang="en-US" dirty="0"/>

</xml_diff>